<commit_message>
Expand slide 22 boxes, enlarge slide 23 owl image
</commit_message>
<xml_diff>
--- a/Week2/TA_Week2.pptx
+++ b/Week2/TA_Week2.pptx
@@ -11499,7 +11499,7 @@
           <a:p>
             <a:fld id="{C3FE843F-D55C-3346-AAC2-DCDC20877A7B}" type="datetimeFigureOut">
               <a:rPr lang="en-US" smtClean="0"/>
-              <a:t>1/13/2026</a:t>
+              <a:t>1/14/2026</a:t>
             </a:fld>
             <a:endParaRPr lang="en-US"/>
           </a:p>
@@ -16161,7 +16161,7 @@
         </p:blipFill>
         <p:spPr>
           <a:xfrm>
-            <a:off x="825747" y="1985756"/>
+            <a:off x="781297" y="1944481"/>
             <a:ext cx="4270315" cy="2517799"/>
           </a:xfrm>
           <a:prstGeom prst="rect">
@@ -17396,14 +17396,15 @@
         </p:nvPicPr>
         <p:blipFill>
           <a:blip r:embed="rId3"/>
+          <a:srcRect t="10886"/>
           <a:stretch>
             <a:fillRect/>
           </a:stretch>
         </p:blipFill>
         <p:spPr>
           <a:xfrm>
-            <a:off x="3341618" y="1310798"/>
-            <a:ext cx="4862066" cy="2965406"/>
+            <a:off x="3027180" y="1409550"/>
+            <a:ext cx="4862066" cy="2642572"/>
           </a:xfrm>
           <a:prstGeom prst="rect">
             <a:avLst/>

</xml_diff>